<commit_message>
Updated repository for readability
</commit_message>
<xml_diff>
--- a/public/Documentation_Diagrams.pptx
+++ b/public/Documentation_Diagrams.pptx
@@ -259,7 +259,7 @@
           <a:p>
             <a:fld id="{7CD806DF-A438-493C-BD9D-ACBE9EA19DF9}" type="datetimeFigureOut">
               <a:rPr lang="en-US" smtClean="0"/>
-              <a:t>11/14/2021</a:t>
+              <a:t>11/15/2021</a:t>
             </a:fld>
             <a:endParaRPr lang="en-US"/>
           </a:p>
@@ -457,7 +457,7 @@
           <a:p>
             <a:fld id="{7CD806DF-A438-493C-BD9D-ACBE9EA19DF9}" type="datetimeFigureOut">
               <a:rPr lang="en-US" smtClean="0"/>
-              <a:t>11/14/2021</a:t>
+              <a:t>11/15/2021</a:t>
             </a:fld>
             <a:endParaRPr lang="en-US"/>
           </a:p>
@@ -665,7 +665,7 @@
           <a:p>
             <a:fld id="{7CD806DF-A438-493C-BD9D-ACBE9EA19DF9}" type="datetimeFigureOut">
               <a:rPr lang="en-US" smtClean="0"/>
-              <a:t>11/14/2021</a:t>
+              <a:t>11/15/2021</a:t>
             </a:fld>
             <a:endParaRPr lang="en-US"/>
           </a:p>
@@ -863,7 +863,7 @@
           <a:p>
             <a:fld id="{7CD806DF-A438-493C-BD9D-ACBE9EA19DF9}" type="datetimeFigureOut">
               <a:rPr lang="en-US" smtClean="0"/>
-              <a:t>11/14/2021</a:t>
+              <a:t>11/15/2021</a:t>
             </a:fld>
             <a:endParaRPr lang="en-US"/>
           </a:p>
@@ -1138,7 +1138,7 @@
           <a:p>
             <a:fld id="{7CD806DF-A438-493C-BD9D-ACBE9EA19DF9}" type="datetimeFigureOut">
               <a:rPr lang="en-US" smtClean="0"/>
-              <a:t>11/14/2021</a:t>
+              <a:t>11/15/2021</a:t>
             </a:fld>
             <a:endParaRPr lang="en-US"/>
           </a:p>
@@ -1403,7 +1403,7 @@
           <a:p>
             <a:fld id="{7CD806DF-A438-493C-BD9D-ACBE9EA19DF9}" type="datetimeFigureOut">
               <a:rPr lang="en-US" smtClean="0"/>
-              <a:t>11/14/2021</a:t>
+              <a:t>11/15/2021</a:t>
             </a:fld>
             <a:endParaRPr lang="en-US"/>
           </a:p>
@@ -1815,7 +1815,7 @@
           <a:p>
             <a:fld id="{7CD806DF-A438-493C-BD9D-ACBE9EA19DF9}" type="datetimeFigureOut">
               <a:rPr lang="en-US" smtClean="0"/>
-              <a:t>11/14/2021</a:t>
+              <a:t>11/15/2021</a:t>
             </a:fld>
             <a:endParaRPr lang="en-US"/>
           </a:p>
@@ -1956,7 +1956,7 @@
           <a:p>
             <a:fld id="{7CD806DF-A438-493C-BD9D-ACBE9EA19DF9}" type="datetimeFigureOut">
               <a:rPr lang="en-US" smtClean="0"/>
-              <a:t>11/14/2021</a:t>
+              <a:t>11/15/2021</a:t>
             </a:fld>
             <a:endParaRPr lang="en-US"/>
           </a:p>
@@ -2069,7 +2069,7 @@
           <a:p>
             <a:fld id="{7CD806DF-A438-493C-BD9D-ACBE9EA19DF9}" type="datetimeFigureOut">
               <a:rPr lang="en-US" smtClean="0"/>
-              <a:t>11/14/2021</a:t>
+              <a:t>11/15/2021</a:t>
             </a:fld>
             <a:endParaRPr lang="en-US"/>
           </a:p>
@@ -2380,7 +2380,7 @@
           <a:p>
             <a:fld id="{7CD806DF-A438-493C-BD9D-ACBE9EA19DF9}" type="datetimeFigureOut">
               <a:rPr lang="en-US" smtClean="0"/>
-              <a:t>11/14/2021</a:t>
+              <a:t>11/15/2021</a:t>
             </a:fld>
             <a:endParaRPr lang="en-US"/>
           </a:p>
@@ -2668,7 +2668,7 @@
           <a:p>
             <a:fld id="{7CD806DF-A438-493C-BD9D-ACBE9EA19DF9}" type="datetimeFigureOut">
               <a:rPr lang="en-US" smtClean="0"/>
-              <a:t>11/14/2021</a:t>
+              <a:t>11/15/2021</a:t>
             </a:fld>
             <a:endParaRPr lang="en-US"/>
           </a:p>
@@ -2909,7 +2909,7 @@
           <a:p>
             <a:fld id="{7CD806DF-A438-493C-BD9D-ACBE9EA19DF9}" type="datetimeFigureOut">
               <a:rPr lang="en-US" smtClean="0"/>
-              <a:t>11/14/2021</a:t>
+              <a:t>11/15/2021</a:t>
             </a:fld>
             <a:endParaRPr lang="en-US"/>
           </a:p>
@@ -6140,7 +6140,15 @@
             <a:pPr algn="ctr"/>
             <a:r>
               <a:rPr lang="en-US" sz="900" dirty="0"/>
-              <a:t>Group Azimuth reference by CT1, CT2, …, sum(Protein-Sequences)</a:t>
+              <a:t>Group Azimuth reference by CT1, CT2, </a:t>
+            </a:r>
+            <a:r>
+              <a:rPr lang="en-US" sz="900"/>
+              <a:t>…, count(</a:t>
+            </a:r>
+            <a:r>
+              <a:rPr lang="en-US" sz="900" dirty="0"/>
+              <a:t>Protein-Sequences)</a:t>
             </a:r>
           </a:p>
         </p:txBody>

</xml_diff>